<commit_message>
Tweak UML model to account for mandate loss
Some other minor adjustments/relayouting additionally included
</commit_message>
<xml_diff>
--- a/specifiation/Praesentation1.pptx
+++ b/specifiation/Praesentation1.pptx
@@ -10,7 +10,7 @@
     <p:sldId id="258" r:id="rId4"/>
     <p:sldId id="257" r:id="rId5"/>
     <p:sldId id="259" r:id="rId6"/>
-    <p:sldId id="261" r:id="rId7"/>
+    <p:sldId id="262" r:id="rId7"/>
   </p:sldIdLst>
   <p:sldSz cx="12192000" cy="6858000"/>
   <p:notesSz cx="6858000" cy="9144000"/>
@@ -109,6 +109,11 @@
       </a:defRPr>
     </a:lvl9pPr>
   </p:defaultTextStyle>
+  <p:extLst>
+    <p:ext uri="{EFAFB233-063F-42B5-8137-9DF3F51BA10A}">
+      <p15:sldGuideLst xmlns:p15="http://schemas.microsoft.com/office/powerpoint/2012/main"/>
+    </p:ext>
+  </p:extLst>
 </p:presentation>
 </file>
 
@@ -261,7 +266,7 @@
           <a:p>
             <a:fld id="{496946B5-1CC8-47A6-9E31-1FAAE4315D9B}" type="datetimeFigureOut">
               <a:rPr lang="en-US" smtClean="0"/>
-              <a:t>10/22/2019</a:t>
+              <a:t>10/24/19</a:t>
             </a:fld>
             <a:endParaRPr lang="en-US"/>
           </a:p>
@@ -315,7 +320,7 @@
           <a:p>
             <a:fld id="{BD48EF78-8F88-424F-AAB5-FCCADD2EAA8D}" type="slidenum">
               <a:rPr lang="en-US" smtClean="0"/>
-              <a:t>‹Nr.›</a:t>
+              <a:t>‹#›</a:t>
             </a:fld>
             <a:endParaRPr lang="en-US"/>
           </a:p>
@@ -461,7 +466,7 @@
           <a:p>
             <a:fld id="{496946B5-1CC8-47A6-9E31-1FAAE4315D9B}" type="datetimeFigureOut">
               <a:rPr lang="en-US" smtClean="0"/>
-              <a:t>10/22/2019</a:t>
+              <a:t>10/24/19</a:t>
             </a:fld>
             <a:endParaRPr lang="en-US"/>
           </a:p>
@@ -515,7 +520,7 @@
           <a:p>
             <a:fld id="{BD48EF78-8F88-424F-AAB5-FCCADD2EAA8D}" type="slidenum">
               <a:rPr lang="en-US" smtClean="0"/>
-              <a:t>‹Nr.›</a:t>
+              <a:t>‹#›</a:t>
             </a:fld>
             <a:endParaRPr lang="en-US"/>
           </a:p>
@@ -671,7 +676,7 @@
           <a:p>
             <a:fld id="{496946B5-1CC8-47A6-9E31-1FAAE4315D9B}" type="datetimeFigureOut">
               <a:rPr lang="en-US" smtClean="0"/>
-              <a:t>10/22/2019</a:t>
+              <a:t>10/24/19</a:t>
             </a:fld>
             <a:endParaRPr lang="en-US"/>
           </a:p>
@@ -725,7 +730,7 @@
           <a:p>
             <a:fld id="{BD48EF78-8F88-424F-AAB5-FCCADD2EAA8D}" type="slidenum">
               <a:rPr lang="en-US" smtClean="0"/>
-              <a:t>‹Nr.›</a:t>
+              <a:t>‹#›</a:t>
             </a:fld>
             <a:endParaRPr lang="en-US"/>
           </a:p>
@@ -871,7 +876,7 @@
           <a:p>
             <a:fld id="{496946B5-1CC8-47A6-9E31-1FAAE4315D9B}" type="datetimeFigureOut">
               <a:rPr lang="en-US" smtClean="0"/>
-              <a:t>10/22/2019</a:t>
+              <a:t>10/24/19</a:t>
             </a:fld>
             <a:endParaRPr lang="en-US"/>
           </a:p>
@@ -925,7 +930,7 @@
           <a:p>
             <a:fld id="{BD48EF78-8F88-424F-AAB5-FCCADD2EAA8D}" type="slidenum">
               <a:rPr lang="en-US" smtClean="0"/>
-              <a:t>‹Nr.›</a:t>
+              <a:t>‹#›</a:t>
             </a:fld>
             <a:endParaRPr lang="en-US"/>
           </a:p>
@@ -1147,7 +1152,7 @@
           <a:p>
             <a:fld id="{496946B5-1CC8-47A6-9E31-1FAAE4315D9B}" type="datetimeFigureOut">
               <a:rPr lang="en-US" smtClean="0"/>
-              <a:t>10/22/2019</a:t>
+              <a:t>10/24/19</a:t>
             </a:fld>
             <a:endParaRPr lang="en-US"/>
           </a:p>
@@ -1201,7 +1206,7 @@
           <a:p>
             <a:fld id="{BD48EF78-8F88-424F-AAB5-FCCADD2EAA8D}" type="slidenum">
               <a:rPr lang="en-US" smtClean="0"/>
-              <a:t>‹Nr.›</a:t>
+              <a:t>‹#›</a:t>
             </a:fld>
             <a:endParaRPr lang="en-US"/>
           </a:p>
@@ -1415,7 +1420,7 @@
           <a:p>
             <a:fld id="{496946B5-1CC8-47A6-9E31-1FAAE4315D9B}" type="datetimeFigureOut">
               <a:rPr lang="en-US" smtClean="0"/>
-              <a:t>10/22/2019</a:t>
+              <a:t>10/24/19</a:t>
             </a:fld>
             <a:endParaRPr lang="en-US"/>
           </a:p>
@@ -1469,7 +1474,7 @@
           <a:p>
             <a:fld id="{BD48EF78-8F88-424F-AAB5-FCCADD2EAA8D}" type="slidenum">
               <a:rPr lang="en-US" smtClean="0"/>
-              <a:t>‹Nr.›</a:t>
+              <a:t>‹#›</a:t>
             </a:fld>
             <a:endParaRPr lang="en-US"/>
           </a:p>
@@ -1830,7 +1835,7 @@
           <a:p>
             <a:fld id="{496946B5-1CC8-47A6-9E31-1FAAE4315D9B}" type="datetimeFigureOut">
               <a:rPr lang="en-US" smtClean="0"/>
-              <a:t>10/22/2019</a:t>
+              <a:t>10/24/19</a:t>
             </a:fld>
             <a:endParaRPr lang="en-US"/>
           </a:p>
@@ -1884,7 +1889,7 @@
           <a:p>
             <a:fld id="{BD48EF78-8F88-424F-AAB5-FCCADD2EAA8D}" type="slidenum">
               <a:rPr lang="en-US" smtClean="0"/>
-              <a:t>‹Nr.›</a:t>
+              <a:t>‹#›</a:t>
             </a:fld>
             <a:endParaRPr lang="en-US"/>
           </a:p>
@@ -1972,7 +1977,7 @@
           <a:p>
             <a:fld id="{496946B5-1CC8-47A6-9E31-1FAAE4315D9B}" type="datetimeFigureOut">
               <a:rPr lang="en-US" smtClean="0"/>
-              <a:t>10/22/2019</a:t>
+              <a:t>10/24/19</a:t>
             </a:fld>
             <a:endParaRPr lang="en-US"/>
           </a:p>
@@ -2026,7 +2031,7 @@
           <a:p>
             <a:fld id="{BD48EF78-8F88-424F-AAB5-FCCADD2EAA8D}" type="slidenum">
               <a:rPr lang="en-US" smtClean="0"/>
-              <a:t>‹Nr.›</a:t>
+              <a:t>‹#›</a:t>
             </a:fld>
             <a:endParaRPr lang="en-US"/>
           </a:p>
@@ -2085,7 +2090,7 @@
           <a:p>
             <a:fld id="{496946B5-1CC8-47A6-9E31-1FAAE4315D9B}" type="datetimeFigureOut">
               <a:rPr lang="en-US" smtClean="0"/>
-              <a:t>10/22/2019</a:t>
+              <a:t>10/24/19</a:t>
             </a:fld>
             <a:endParaRPr lang="en-US"/>
           </a:p>
@@ -2139,7 +2144,7 @@
           <a:p>
             <a:fld id="{BD48EF78-8F88-424F-AAB5-FCCADD2EAA8D}" type="slidenum">
               <a:rPr lang="en-US" smtClean="0"/>
-              <a:t>‹Nr.›</a:t>
+              <a:t>‹#›</a:t>
             </a:fld>
             <a:endParaRPr lang="en-US"/>
           </a:p>
@@ -2398,7 +2403,7 @@
           <a:p>
             <a:fld id="{496946B5-1CC8-47A6-9E31-1FAAE4315D9B}" type="datetimeFigureOut">
               <a:rPr lang="en-US" smtClean="0"/>
-              <a:t>10/22/2019</a:t>
+              <a:t>10/24/19</a:t>
             </a:fld>
             <a:endParaRPr lang="en-US"/>
           </a:p>
@@ -2452,7 +2457,7 @@
           <a:p>
             <a:fld id="{BD48EF78-8F88-424F-AAB5-FCCADD2EAA8D}" type="slidenum">
               <a:rPr lang="en-US" smtClean="0"/>
-              <a:t>‹Nr.›</a:t>
+              <a:t>‹#›</a:t>
             </a:fld>
             <a:endParaRPr lang="en-US"/>
           </a:p>
@@ -2687,7 +2692,7 @@
           <a:p>
             <a:fld id="{496946B5-1CC8-47A6-9E31-1FAAE4315D9B}" type="datetimeFigureOut">
               <a:rPr lang="en-US" smtClean="0"/>
-              <a:t>10/22/2019</a:t>
+              <a:t>10/24/19</a:t>
             </a:fld>
             <a:endParaRPr lang="en-US"/>
           </a:p>
@@ -2741,7 +2746,7 @@
           <a:p>
             <a:fld id="{BD48EF78-8F88-424F-AAB5-FCCADD2EAA8D}" type="slidenum">
               <a:rPr lang="en-US" smtClean="0"/>
-              <a:t>‹Nr.›</a:t>
+              <a:t>‹#›</a:t>
             </a:fld>
             <a:endParaRPr lang="en-US"/>
           </a:p>
@@ -2930,7 +2935,7 @@
           <a:p>
             <a:fld id="{496946B5-1CC8-47A6-9E31-1FAAE4315D9B}" type="datetimeFigureOut">
               <a:rPr lang="en-US" smtClean="0"/>
-              <a:t>10/22/2019</a:t>
+              <a:t>10/24/19</a:t>
             </a:fld>
             <a:endParaRPr lang="en-US"/>
           </a:p>
@@ -3020,7 +3025,7 @@
           <a:p>
             <a:fld id="{BD48EF78-8F88-424F-AAB5-FCCADD2EAA8D}" type="slidenum">
               <a:rPr lang="en-US" smtClean="0"/>
-              <a:t>‹Nr.›</a:t>
+              <a:t>‹#›</a:t>
             </a:fld>
             <a:endParaRPr lang="en-US"/>
           </a:p>
@@ -3377,6 +3382,42 @@
           </a:prstGeom>
         </p:spPr>
       </p:pic>
+      <p:pic>
+        <p:nvPicPr>
+          <p:cNvPr id="3" name="Picture 2">
+            <a:extLst>
+              <a:ext uri="{FF2B5EF4-FFF2-40B4-BE49-F238E27FC236}">
+                <a16:creationId xmlns:a16="http://schemas.microsoft.com/office/drawing/2014/main" id="{21CF6400-E7E0-A94D-8565-517FB74722EB}"/>
+              </a:ext>
+            </a:extLst>
+          </p:cNvPr>
+          <p:cNvPicPr>
+            <a:picLocks noChangeAspect="1"/>
+          </p:cNvPicPr>
+          <p:nvPr/>
+        </p:nvPicPr>
+        <p:blipFill>
+          <a:blip r:embed="rId3">
+            <a:extLst>
+              <a:ext uri="{28A0092B-C50C-407E-A947-70E740481C1C}">
+                <a14:useLocalDpi xmlns:a14="http://schemas.microsoft.com/office/drawing/2010/main" val="0"/>
+              </a:ext>
+            </a:extLst>
+          </a:blip>
+          <a:stretch>
+            <a:fillRect/>
+          </a:stretch>
+        </p:blipFill>
+        <p:spPr>
+          <a:xfrm>
+            <a:off x="758964" y="0"/>
+            <a:ext cx="10674072" cy="6858000"/>
+          </a:xfrm>
+          <a:prstGeom prst="rect">
+            <a:avLst/>
+          </a:prstGeom>
+        </p:spPr>
+      </p:pic>
     </p:spTree>
     <p:extLst>
       <p:ext uri="{BB962C8B-B14F-4D97-AF65-F5344CB8AC3E}">
@@ -3409,10 +3450,10 @@
       </p:grpSpPr>
       <p:pic>
         <p:nvPicPr>
-          <p:cNvPr id="4" name="Grafik 3">
-            <a:extLst>
-              <a:ext uri="{FF2B5EF4-FFF2-40B4-BE49-F238E27FC236}">
-                <a16:creationId xmlns:a16="http://schemas.microsoft.com/office/drawing/2014/main" id="{C825AF09-BF5E-4FE1-9833-8931533F748A}"/>
+          <p:cNvPr id="10" name="Picture 9">
+            <a:extLst>
+              <a:ext uri="{FF2B5EF4-FFF2-40B4-BE49-F238E27FC236}">
+                <a16:creationId xmlns:a16="http://schemas.microsoft.com/office/drawing/2014/main" id="{CAA630FE-2186-3840-90BA-6AC4275E4FCC}"/>
               </a:ext>
             </a:extLst>
           </p:cNvPr>
@@ -3422,15 +3463,21 @@
           <p:nvPr/>
         </p:nvPicPr>
         <p:blipFill>
-          <a:blip r:embed="rId2"/>
+          <a:blip r:embed="rId2">
+            <a:extLst>
+              <a:ext uri="{28A0092B-C50C-407E-A947-70E740481C1C}">
+                <a14:useLocalDpi xmlns:a14="http://schemas.microsoft.com/office/drawing/2010/main" val="0"/>
+              </a:ext>
+            </a:extLst>
+          </a:blip>
           <a:stretch>
             <a:fillRect/>
           </a:stretch>
         </p:blipFill>
         <p:spPr>
           <a:xfrm>
-            <a:off x="1644931" y="0"/>
-            <a:ext cx="8902137" cy="6858000"/>
+            <a:off x="758964" y="0"/>
+            <a:ext cx="10674072" cy="6858000"/>
           </a:xfrm>
           <a:prstGeom prst="rect">
             <a:avLst/>
@@ -3451,8 +3498,8 @@
         </p:nvSpPr>
         <p:spPr>
           <a:xfrm>
-            <a:off x="4739780" y="302004"/>
-            <a:ext cx="5192785" cy="3682767"/>
+            <a:off x="4454554" y="160638"/>
+            <a:ext cx="6221684" cy="4040659"/>
           </a:xfrm>
           <a:prstGeom prst="rect">
             <a:avLst/>
@@ -3503,8 +3550,8 @@
         </p:nvSpPr>
         <p:spPr>
           <a:xfrm>
-            <a:off x="5368954" y="4546833"/>
-            <a:ext cx="3624044" cy="2207704"/>
+            <a:off x="4454554" y="4460336"/>
+            <a:ext cx="4071608" cy="2237026"/>
           </a:xfrm>
           <a:prstGeom prst="rect">
             <a:avLst/>
@@ -3555,7 +3602,7 @@
         </p:nvSpPr>
         <p:spPr>
           <a:xfrm>
-            <a:off x="1451295" y="135622"/>
+            <a:off x="832763" y="75285"/>
             <a:ext cx="2885813" cy="2207704"/>
           </a:xfrm>
           <a:prstGeom prst="rect">
@@ -3606,8 +3653,47 @@
           <p:nvPr/>
         </p:nvSpPr>
         <p:spPr>
+          <a:xfrm flipH="1">
+            <a:off x="10432852" y="160638"/>
+            <a:ext cx="243386" cy="369332"/>
+          </a:xfrm>
+          <a:prstGeom prst="rect">
+            <a:avLst/>
+          </a:prstGeom>
+          <a:noFill/>
+        </p:spPr>
+        <p:txBody>
+          <a:bodyPr wrap="square" rtlCol="0">
+            <a:spAutoFit/>
+          </a:bodyPr>
+          <a:lstStyle/>
+          <a:p>
+            <a:r>
+              <a:rPr lang="en-US" dirty="0">
+                <a:solidFill>
+                  <a:srgbClr val="C00000"/>
+                </a:solidFill>
+              </a:rPr>
+              <a:t>1</a:t>
+            </a:r>
+          </a:p>
+        </p:txBody>
+      </p:sp>
+      <p:sp>
+        <p:nvSpPr>
+          <p:cNvPr id="8" name="Textfeld 7">
+            <a:extLst>
+              <a:ext uri="{FF2B5EF4-FFF2-40B4-BE49-F238E27FC236}">
+                <a16:creationId xmlns:a16="http://schemas.microsoft.com/office/drawing/2014/main" id="{45CD0174-E069-4F5A-8235-8B0228F11992}"/>
+              </a:ext>
+            </a:extLst>
+          </p:cNvPr>
+          <p:cNvSpPr txBox="1"/>
+          <p:nvPr/>
+        </p:nvSpPr>
+        <p:spPr>
           <a:xfrm>
-            <a:off x="9975358" y="302004"/>
+            <a:off x="3434029" y="75285"/>
             <a:ext cx="301686" cy="369332"/>
           </a:xfrm>
           <a:prstGeom prst="rect">
@@ -3627,17 +3713,17 @@
                   <a:srgbClr val="C00000"/>
                 </a:solidFill>
               </a:rPr>
-              <a:t>1</a:t>
-            </a:r>
-          </a:p>
-        </p:txBody>
-      </p:sp>
-      <p:sp>
-        <p:nvSpPr>
-          <p:cNvPr id="7" name="Textfeld 6">
-            <a:extLst>
-              <a:ext uri="{FF2B5EF4-FFF2-40B4-BE49-F238E27FC236}">
-                <a16:creationId xmlns:a16="http://schemas.microsoft.com/office/drawing/2014/main" id="{EECD2DB8-7D07-4108-AD6B-DC3A22060279}"/>
+              <a:t>2</a:t>
+            </a:r>
+          </a:p>
+        </p:txBody>
+      </p:sp>
+      <p:sp>
+        <p:nvSpPr>
+          <p:cNvPr id="11" name="Textfeld 6">
+            <a:extLst>
+              <a:ext uri="{FF2B5EF4-FFF2-40B4-BE49-F238E27FC236}">
+                <a16:creationId xmlns:a16="http://schemas.microsoft.com/office/drawing/2014/main" id="{BB7D2D92-D1CB-8840-84D4-F40884165633}"/>
               </a:ext>
             </a:extLst>
           </p:cNvPr>
@@ -3646,8 +3732,8 @@
         </p:nvSpPr>
         <p:spPr>
           <a:xfrm>
-            <a:off x="8992998" y="4615344"/>
-            <a:ext cx="301686" cy="369332"/>
+            <a:off x="8263949" y="4467062"/>
+            <a:ext cx="338944" cy="374237"/>
           </a:xfrm>
           <a:prstGeom prst="rect">
             <a:avLst/>
@@ -3655,7 +3741,7 @@
           <a:noFill/>
         </p:spPr>
         <p:txBody>
-          <a:bodyPr wrap="none" rtlCol="0">
+          <a:bodyPr wrap="square" rtlCol="0">
             <a:spAutoFit/>
           </a:bodyPr>
           <a:lstStyle/>
@@ -3667,45 +3753,6 @@
                 </a:solidFill>
               </a:rPr>
               <a:t>3</a:t>
-            </a:r>
-          </a:p>
-        </p:txBody>
-      </p:sp>
-      <p:sp>
-        <p:nvSpPr>
-          <p:cNvPr id="8" name="Textfeld 7">
-            <a:extLst>
-              <a:ext uri="{FF2B5EF4-FFF2-40B4-BE49-F238E27FC236}">
-                <a16:creationId xmlns:a16="http://schemas.microsoft.com/office/drawing/2014/main" id="{45CD0174-E069-4F5A-8235-8B0228F11992}"/>
-              </a:ext>
-            </a:extLst>
-          </p:cNvPr>
-          <p:cNvSpPr txBox="1"/>
-          <p:nvPr/>
-        </p:nvSpPr>
-        <p:spPr>
-          <a:xfrm>
-            <a:off x="4378894" y="75285"/>
-            <a:ext cx="301686" cy="369332"/>
-          </a:xfrm>
-          <a:prstGeom prst="rect">
-            <a:avLst/>
-          </a:prstGeom>
-          <a:noFill/>
-        </p:spPr>
-        <p:txBody>
-          <a:bodyPr wrap="none" rtlCol="0">
-            <a:spAutoFit/>
-          </a:bodyPr>
-          <a:lstStyle/>
-          <a:p>
-            <a:r>
-              <a:rPr lang="en-US" dirty="0">
-                <a:solidFill>
-                  <a:srgbClr val="C00000"/>
-                </a:solidFill>
-              </a:rPr>
-              <a:t>2</a:t>
             </a:r>
           </a:p>
         </p:txBody>
@@ -3742,10 +3789,10 @@
       </p:grpSpPr>
       <p:pic>
         <p:nvPicPr>
-          <p:cNvPr id="4" name="Grafik 3">
-            <a:extLst>
-              <a:ext uri="{FF2B5EF4-FFF2-40B4-BE49-F238E27FC236}">
-                <a16:creationId xmlns:a16="http://schemas.microsoft.com/office/drawing/2014/main" id="{72D22565-051F-4DA1-9581-F0FD9963D040}"/>
+          <p:cNvPr id="6" name="Picture 5">
+            <a:extLst>
+              <a:ext uri="{FF2B5EF4-FFF2-40B4-BE49-F238E27FC236}">
+                <a16:creationId xmlns:a16="http://schemas.microsoft.com/office/drawing/2014/main" id="{D894C94E-4B94-EC41-AE2C-9DA9C52808DA}"/>
               </a:ext>
             </a:extLst>
           </p:cNvPr>
@@ -3755,15 +3802,21 @@
           <p:nvPr/>
         </p:nvPicPr>
         <p:blipFill>
-          <a:blip r:embed="rId2"/>
+          <a:blip r:embed="rId2">
+            <a:extLst>
+              <a:ext uri="{28A0092B-C50C-407E-A947-70E740481C1C}">
+                <a14:useLocalDpi xmlns:a14="http://schemas.microsoft.com/office/drawing/2010/main" val="0"/>
+              </a:ext>
+            </a:extLst>
+          </a:blip>
           <a:stretch>
             <a:fillRect/>
           </a:stretch>
         </p:blipFill>
         <p:spPr>
           <a:xfrm>
-            <a:off x="1119187" y="119062"/>
-            <a:ext cx="9953625" cy="6619875"/>
+            <a:off x="0" y="198986"/>
+            <a:ext cx="12192000" cy="6460027"/>
           </a:xfrm>
           <a:prstGeom prst="rect">
             <a:avLst/>
@@ -3802,10 +3855,10 @@
       </p:grpSpPr>
       <p:pic>
         <p:nvPicPr>
-          <p:cNvPr id="5" name="Grafik 4">
-            <a:extLst>
-              <a:ext uri="{FF2B5EF4-FFF2-40B4-BE49-F238E27FC236}">
-                <a16:creationId xmlns:a16="http://schemas.microsoft.com/office/drawing/2014/main" id="{CDBCE793-B31D-4E3F-A2D4-76DDB04ABCB5}"/>
+          <p:cNvPr id="3" name="Picture 2">
+            <a:extLst>
+              <a:ext uri="{FF2B5EF4-FFF2-40B4-BE49-F238E27FC236}">
+                <a16:creationId xmlns:a16="http://schemas.microsoft.com/office/drawing/2014/main" id="{99CF1C08-07B1-DF4C-BE70-20068472B001}"/>
               </a:ext>
             </a:extLst>
           </p:cNvPr>
@@ -3815,15 +3868,21 @@
           <p:nvPr/>
         </p:nvPicPr>
         <p:blipFill>
-          <a:blip r:embed="rId2"/>
+          <a:blip r:embed="rId2">
+            <a:extLst>
+              <a:ext uri="{28A0092B-C50C-407E-A947-70E740481C1C}">
+                <a14:useLocalDpi xmlns:a14="http://schemas.microsoft.com/office/drawing/2010/main" val="0"/>
+              </a:ext>
+            </a:extLst>
+          </a:blip>
           <a:stretch>
             <a:fillRect/>
           </a:stretch>
         </p:blipFill>
         <p:spPr>
           <a:xfrm>
-            <a:off x="3073429" y="803289"/>
-            <a:ext cx="5810250" cy="5133975"/>
+            <a:off x="3625850" y="1327150"/>
+            <a:ext cx="4940300" cy="4203700"/>
           </a:xfrm>
           <a:prstGeom prst="rect">
             <a:avLst/>
@@ -3862,10 +3921,10 @@
       </p:grpSpPr>
       <p:pic>
         <p:nvPicPr>
-          <p:cNvPr id="4" name="Grafik 3">
-            <a:extLst>
-              <a:ext uri="{FF2B5EF4-FFF2-40B4-BE49-F238E27FC236}">
-                <a16:creationId xmlns:a16="http://schemas.microsoft.com/office/drawing/2014/main" id="{009FFF2C-51EE-4279-9892-4E76050852BE}"/>
+          <p:cNvPr id="3" name="Picture 2">
+            <a:extLst>
+              <a:ext uri="{FF2B5EF4-FFF2-40B4-BE49-F238E27FC236}">
+                <a16:creationId xmlns:a16="http://schemas.microsoft.com/office/drawing/2014/main" id="{5C64B29E-1FBF-7D4E-A8D3-4A1E9F23BA8C}"/>
               </a:ext>
             </a:extLst>
           </p:cNvPr>
@@ -3875,15 +3934,21 @@
           <p:nvPr/>
         </p:nvPicPr>
         <p:blipFill>
-          <a:blip r:embed="rId2"/>
+          <a:blip r:embed="rId2">
+            <a:extLst>
+              <a:ext uri="{28A0092B-C50C-407E-A947-70E740481C1C}">
+                <a14:useLocalDpi xmlns:a14="http://schemas.microsoft.com/office/drawing/2010/main" val="0"/>
+              </a:ext>
+            </a:extLst>
+          </a:blip>
           <a:stretch>
             <a:fillRect/>
           </a:stretch>
         </p:blipFill>
         <p:spPr>
           <a:xfrm>
-            <a:off x="2461368" y="1295480"/>
-            <a:ext cx="7269263" cy="4518090"/>
+            <a:off x="920750" y="1447800"/>
+            <a:ext cx="10350500" cy="3962400"/>
           </a:xfrm>
           <a:prstGeom prst="rect">
             <a:avLst/>
@@ -3950,10 +4015,46 @@
           </a:prstGeom>
         </p:spPr>
       </p:pic>
+      <p:pic>
+        <p:nvPicPr>
+          <p:cNvPr id="3" name="Picture 2">
+            <a:extLst>
+              <a:ext uri="{FF2B5EF4-FFF2-40B4-BE49-F238E27FC236}">
+                <a16:creationId xmlns:a16="http://schemas.microsoft.com/office/drawing/2014/main" id="{21CF6400-E7E0-A94D-8565-517FB74722EB}"/>
+              </a:ext>
+            </a:extLst>
+          </p:cNvPr>
+          <p:cNvPicPr>
+            <a:picLocks noChangeAspect="1"/>
+          </p:cNvPicPr>
+          <p:nvPr/>
+        </p:nvPicPr>
+        <p:blipFill>
+          <a:blip r:embed="rId3">
+            <a:extLst>
+              <a:ext uri="{28A0092B-C50C-407E-A947-70E740481C1C}">
+                <a14:useLocalDpi xmlns:a14="http://schemas.microsoft.com/office/drawing/2010/main" val="0"/>
+              </a:ext>
+            </a:extLst>
+          </a:blip>
+          <a:stretch>
+            <a:fillRect/>
+          </a:stretch>
+        </p:blipFill>
+        <p:spPr>
+          <a:xfrm>
+            <a:off x="758964" y="0"/>
+            <a:ext cx="10674072" cy="6858000"/>
+          </a:xfrm>
+          <a:prstGeom prst="rect">
+            <a:avLst/>
+          </a:prstGeom>
+        </p:spPr>
+      </p:pic>
     </p:spTree>
     <p:extLst>
       <p:ext uri="{BB962C8B-B14F-4D97-AF65-F5344CB8AC3E}">
-        <p14:creationId xmlns:p14="http://schemas.microsoft.com/office/powerpoint/2010/main" val="3318606940"/>
+        <p14:creationId xmlns:p14="http://schemas.microsoft.com/office/powerpoint/2010/main" val="2063741649"/>
       </p:ext>
     </p:extLst>
   </p:cSld>

</xml_diff>